<commit_message>
Adjust new architecture diagram.
</commit_message>
<xml_diff>
--- a/docs/images/architecture_diagram.pptx
+++ b/docs/images/architecture_diagram.pptx
@@ -4800,7 +4800,7 @@
         </p:blipFill>
         <p:spPr bwMode="auto">
           <a:xfrm>
-            <a:off x="2632223" y="1495896"/>
+            <a:off x="2671160" y="1485930"/>
             <a:ext cx="457200" cy="457200"/>
           </a:xfrm>
           <a:prstGeom prst="rect">
@@ -5068,7 +5068,7 @@
         </p:nvSpPr>
         <p:spPr bwMode="auto">
           <a:xfrm>
-            <a:off x="2237434" y="1958353"/>
+            <a:off x="2276371" y="1948387"/>
             <a:ext cx="1234766" cy="261610"/>
           </a:xfrm>
           <a:prstGeom prst="rect">
@@ -5369,7 +5369,7 @@
                 <a:ea typeface="Amazon Ember" panose="020B0603020204020204" pitchFamily="34" charset="0"/>
                 <a:cs typeface="Arial" panose="020B0604020202020204" pitchFamily="34" charset="0"/>
               </a:rPr>
-              <a:t>Volume</a:t>
+              <a:t>EBS Volume</a:t>
             </a:r>
           </a:p>
         </p:txBody>
@@ -5590,7 +5590,7 @@
                 <a:ea typeface="Amazon Ember" panose="020B0603020204020204" pitchFamily="34" charset="0"/>
                 <a:cs typeface="Arial" panose="020B0604020202020204" pitchFamily="34" charset="0"/>
               </a:rPr>
-              <a:t>Queue</a:t>
+              <a:t>Migration queue</a:t>
             </a:r>
           </a:p>
         </p:txBody>
@@ -6460,7 +6460,7 @@
         </p:blipFill>
         <p:spPr bwMode="auto">
           <a:xfrm>
-            <a:off x="5836328" y="1495896"/>
+            <a:off x="5898056" y="1507986"/>
             <a:ext cx="457200" cy="457200"/>
           </a:xfrm>
           <a:prstGeom prst="rect">
@@ -6728,7 +6728,7 @@
         </p:nvSpPr>
         <p:spPr bwMode="auto">
           <a:xfrm>
-            <a:off x="5441539" y="1958353"/>
+            <a:off x="5503267" y="1970443"/>
             <a:ext cx="1234766" cy="261610"/>
           </a:xfrm>
           <a:prstGeom prst="rect">
@@ -7029,7 +7029,7 @@
                 <a:ea typeface="Amazon Ember" panose="020B0603020204020204" pitchFamily="34" charset="0"/>
                 <a:cs typeface="Arial" panose="020B0604020202020204" pitchFamily="34" charset="0"/>
               </a:rPr>
-              <a:t>Volume</a:t>
+              <a:t>EBS Volume</a:t>
             </a:r>
           </a:p>
         </p:txBody>
@@ -7678,7 +7678,7 @@
         </p:blipFill>
         <p:spPr bwMode="auto">
           <a:xfrm>
-            <a:off x="8349835" y="1495896"/>
+            <a:off x="8416197" y="1485930"/>
             <a:ext cx="457200" cy="457200"/>
           </a:xfrm>
           <a:prstGeom prst="rect">
@@ -7946,7 +7946,7 @@
         </p:nvSpPr>
         <p:spPr bwMode="auto">
           <a:xfrm>
-            <a:off x="7955046" y="1958353"/>
+            <a:off x="8021408" y="1948387"/>
             <a:ext cx="1234766" cy="261610"/>
           </a:xfrm>
           <a:prstGeom prst="rect">
@@ -8247,7 +8247,7 @@
                 <a:ea typeface="Amazon Ember" panose="020B0603020204020204" pitchFamily="34" charset="0"/>
                 <a:cs typeface="Arial" panose="020B0604020202020204" pitchFamily="34" charset="0"/>
               </a:rPr>
-              <a:t>Volume</a:t>
+              <a:t>EBS Volume</a:t>
             </a:r>
           </a:p>
         </p:txBody>

</xml_diff>

<commit_message>
Adjustments for Tech writer review
</commit_message>
<xml_diff>
--- a/docs/images/architecture_diagram.pptx
+++ b/docs/images/architecture_diagram.pptx
@@ -3335,8 +3335,8 @@
         </p:nvSpPr>
         <p:spPr>
           <a:xfrm>
-            <a:off x="296862" y="286797"/>
-            <a:ext cx="11339464" cy="5526223"/>
+            <a:off x="296861" y="286797"/>
+            <a:ext cx="11428607" cy="5526223"/>
           </a:xfrm>
           <a:prstGeom prst="rect">
             <a:avLst/>
@@ -5434,173 +5434,12 @@
           </a:extLst>
         </p:spPr>
       </p:pic>
-      <p:sp>
-        <p:nvSpPr>
-          <p:cNvPr id="61" name="TextBox 22">
-            <a:extLst>
-              <a:ext uri="{FF2B5EF4-FFF2-40B4-BE49-F238E27FC236}">
-                <a16:creationId xmlns:a16="http://schemas.microsoft.com/office/drawing/2014/main" id="{E14BBA81-C204-4345-B855-BFB755EABA0A}"/>
-              </a:ext>
-            </a:extLst>
-          </p:cNvPr>
-          <p:cNvSpPr txBox="1">
-            <a:spLocks noChangeArrowheads="1"/>
-          </p:cNvSpPr>
-          <p:nvPr/>
-        </p:nvSpPr>
-        <p:spPr bwMode="auto">
-          <a:xfrm>
-            <a:off x="10137487" y="4787083"/>
-            <a:ext cx="1373188" cy="261610"/>
-          </a:xfrm>
-          <a:prstGeom prst="rect">
-            <a:avLst/>
-          </a:prstGeom>
-          <a:noFill/>
-          <a:ln>
-            <a:noFill/>
-          </a:ln>
-          <a:extLst>
-            <a:ext uri="{909E8E84-426E-40DD-AFC4-6F175D3DCCD1}">
-              <a14:hiddenFill xmlns:a14="http://schemas.microsoft.com/office/drawing/2010/main">
-                <a:solidFill>
-                  <a:srgbClr val="FFFFFF"/>
-                </a:solidFill>
-              </a14:hiddenFill>
-            </a:ext>
-            <a:ext uri="{91240B29-F687-4F45-9708-019B960494DF}">
-              <a14:hiddenLine xmlns:a14="http://schemas.microsoft.com/office/drawing/2010/main" w="9525">
-                <a:solidFill>
-                  <a:srgbClr val="000000"/>
-                </a:solidFill>
-                <a:miter lim="800000"/>
-                <a:headEnd/>
-                <a:tailEnd/>
-              </a14:hiddenLine>
-            </a:ext>
-          </a:extLst>
-        </p:spPr>
-        <p:txBody>
-          <a:bodyPr wrap="square">
-            <a:spAutoFit/>
-          </a:bodyPr>
-          <a:lstStyle>
-            <a:lvl1pPr>
-              <a:defRPr>
-                <a:solidFill>
-                  <a:schemeClr val="tx1"/>
-                </a:solidFill>
-                <a:latin typeface="Calibri" panose="020F0502020204030204" pitchFamily="34" charset="0"/>
-              </a:defRPr>
-            </a:lvl1pPr>
-            <a:lvl2pPr marL="742950" indent="-285750">
-              <a:defRPr>
-                <a:solidFill>
-                  <a:schemeClr val="tx1"/>
-                </a:solidFill>
-                <a:latin typeface="Calibri" panose="020F0502020204030204" pitchFamily="34" charset="0"/>
-              </a:defRPr>
-            </a:lvl2pPr>
-            <a:lvl3pPr marL="1143000" indent="-228600">
-              <a:defRPr>
-                <a:solidFill>
-                  <a:schemeClr val="tx1"/>
-                </a:solidFill>
-                <a:latin typeface="Calibri" panose="020F0502020204030204" pitchFamily="34" charset="0"/>
-              </a:defRPr>
-            </a:lvl3pPr>
-            <a:lvl4pPr marL="1600200" indent="-228600">
-              <a:defRPr>
-                <a:solidFill>
-                  <a:schemeClr val="tx1"/>
-                </a:solidFill>
-                <a:latin typeface="Calibri" panose="020F0502020204030204" pitchFamily="34" charset="0"/>
-              </a:defRPr>
-            </a:lvl4pPr>
-            <a:lvl5pPr marL="2057400" indent="-228600">
-              <a:defRPr>
-                <a:solidFill>
-                  <a:schemeClr val="tx1"/>
-                </a:solidFill>
-                <a:latin typeface="Calibri" panose="020F0502020204030204" pitchFamily="34" charset="0"/>
-              </a:defRPr>
-            </a:lvl5pPr>
-            <a:lvl6pPr marL="2514600" indent="-228600" eaLnBrk="0" fontAlgn="base" hangingPunct="0">
-              <a:spcBef>
-                <a:spcPct val="0"/>
-              </a:spcBef>
-              <a:spcAft>
-                <a:spcPct val="0"/>
-              </a:spcAft>
-              <a:defRPr>
-                <a:solidFill>
-                  <a:schemeClr val="tx1"/>
-                </a:solidFill>
-                <a:latin typeface="Calibri" panose="020F0502020204030204" pitchFamily="34" charset="0"/>
-              </a:defRPr>
-            </a:lvl6pPr>
-            <a:lvl7pPr marL="2971800" indent="-228600" eaLnBrk="0" fontAlgn="base" hangingPunct="0">
-              <a:spcBef>
-                <a:spcPct val="0"/>
-              </a:spcBef>
-              <a:spcAft>
-                <a:spcPct val="0"/>
-              </a:spcAft>
-              <a:defRPr>
-                <a:solidFill>
-                  <a:schemeClr val="tx1"/>
-                </a:solidFill>
-                <a:latin typeface="Calibri" panose="020F0502020204030204" pitchFamily="34" charset="0"/>
-              </a:defRPr>
-            </a:lvl7pPr>
-            <a:lvl8pPr marL="3429000" indent="-228600" eaLnBrk="0" fontAlgn="base" hangingPunct="0">
-              <a:spcBef>
-                <a:spcPct val="0"/>
-              </a:spcBef>
-              <a:spcAft>
-                <a:spcPct val="0"/>
-              </a:spcAft>
-              <a:defRPr>
-                <a:solidFill>
-                  <a:schemeClr val="tx1"/>
-                </a:solidFill>
-                <a:latin typeface="Calibri" panose="020F0502020204030204" pitchFamily="34" charset="0"/>
-              </a:defRPr>
-            </a:lvl8pPr>
-            <a:lvl9pPr marL="3886200" indent="-228600" eaLnBrk="0" fontAlgn="base" hangingPunct="0">
-              <a:spcBef>
-                <a:spcPct val="0"/>
-              </a:spcBef>
-              <a:spcAft>
-                <a:spcPct val="0"/>
-              </a:spcAft>
-              <a:defRPr>
-                <a:solidFill>
-                  <a:schemeClr val="tx1"/>
-                </a:solidFill>
-                <a:latin typeface="Calibri" panose="020F0502020204030204" pitchFamily="34" charset="0"/>
-              </a:defRPr>
-            </a:lvl9pPr>
-          </a:lstStyle>
-          <a:p>
-            <a:pPr algn="ctr" eaLnBrk="1" hangingPunct="1"/>
-            <a:r>
-              <a:rPr lang="en-US" altLang="en-US" sz="1100" dirty="0">
-                <a:latin typeface="Arial" panose="020B0604020202020204" pitchFamily="34" charset="0"/>
-                <a:ea typeface="Amazon Ember" panose="020B0603020204020204" pitchFamily="34" charset="0"/>
-                <a:cs typeface="Arial" panose="020B0604020202020204" pitchFamily="34" charset="0"/>
-              </a:rPr>
-              <a:t>Migration queue</a:t>
-            </a:r>
-          </a:p>
-        </p:txBody>
-      </p:sp>
       <p:pic>
         <p:nvPicPr>
-          <p:cNvPr id="62" name="Graphic 29">
-            <a:extLst>
-              <a:ext uri="{FF2B5EF4-FFF2-40B4-BE49-F238E27FC236}">
-                <a16:creationId xmlns:a16="http://schemas.microsoft.com/office/drawing/2014/main" id="{03A99C76-B13A-C945-8320-85017EC0D703}"/>
+          <p:cNvPr id="63" name="Graphic 17">
+            <a:extLst>
+              <a:ext uri="{FF2B5EF4-FFF2-40B4-BE49-F238E27FC236}">
+                <a16:creationId xmlns:a16="http://schemas.microsoft.com/office/drawing/2014/main" id="{DCA0E097-8647-C642-8438-06D2DF86D557}"/>
               </a:ext>
             </a:extLst>
           </p:cNvPr>
@@ -5611,66 +5450,6 @@
         </p:nvPicPr>
         <p:blipFill>
           <a:blip r:embed="rId10">
-            <a:extLst>
-              <a:ext uri="{28A0092B-C50C-407E-A947-70E740481C1C}">
-                <a14:useLocalDpi xmlns:a14="http://schemas.microsoft.com/office/drawing/2010/main" val="0"/>
-              </a:ext>
-            </a:extLst>
-          </a:blip>
-          <a:srcRect/>
-          <a:stretch>
-            <a:fillRect/>
-          </a:stretch>
-        </p:blipFill>
-        <p:spPr bwMode="auto">
-          <a:xfrm>
-            <a:off x="10587890" y="4355283"/>
-            <a:ext cx="457200" cy="457200"/>
-          </a:xfrm>
-          <a:prstGeom prst="rect">
-            <a:avLst/>
-          </a:prstGeom>
-          <a:noFill/>
-          <a:ln>
-            <a:noFill/>
-          </a:ln>
-          <a:extLst>
-            <a:ext uri="{909E8E84-426E-40DD-AFC4-6F175D3DCCD1}">
-              <a14:hiddenFill xmlns:a14="http://schemas.microsoft.com/office/drawing/2010/main">
-                <a:solidFill>
-                  <a:srgbClr val="FFFFFF"/>
-                </a:solidFill>
-              </a14:hiddenFill>
-            </a:ext>
-            <a:ext uri="{91240B29-F687-4F45-9708-019B960494DF}">
-              <a14:hiddenLine xmlns:a14="http://schemas.microsoft.com/office/drawing/2010/main" w="9525">
-                <a:solidFill>
-                  <a:srgbClr val="000000"/>
-                </a:solidFill>
-                <a:miter lim="800000"/>
-                <a:headEnd/>
-                <a:tailEnd/>
-              </a14:hiddenLine>
-            </a:ext>
-          </a:extLst>
-        </p:spPr>
-      </p:pic>
-      <p:pic>
-        <p:nvPicPr>
-          <p:cNvPr id="63" name="Graphic 17">
-            <a:extLst>
-              <a:ext uri="{FF2B5EF4-FFF2-40B4-BE49-F238E27FC236}">
-                <a16:creationId xmlns:a16="http://schemas.microsoft.com/office/drawing/2014/main" id="{DCA0E097-8647-C642-8438-06D2DF86D557}"/>
-              </a:ext>
-            </a:extLst>
-          </p:cNvPr>
-          <p:cNvPicPr>
-            <a:picLocks noChangeAspect="1" noChangeArrowheads="1"/>
-          </p:cNvPicPr>
-          <p:nvPr/>
-        </p:nvPicPr>
-        <p:blipFill>
-          <a:blip r:embed="rId11">
             <a:extLst>
               <a:ext uri="{28A0092B-C50C-407E-A947-70E740481C1C}">
                 <a14:useLocalDpi xmlns:a14="http://schemas.microsoft.com/office/drawing/2010/main" val="0"/>
@@ -8312,6 +8091,227 @@
           </a:extLst>
         </p:spPr>
       </p:pic>
+      <p:pic>
+        <p:nvPicPr>
+          <p:cNvPr id="109" name="Graphic 26">
+            <a:extLst>
+              <a:ext uri="{FF2B5EF4-FFF2-40B4-BE49-F238E27FC236}">
+                <a16:creationId xmlns:a16="http://schemas.microsoft.com/office/drawing/2014/main" id="{17AF5E85-3C5F-F948-802C-5F7B229938EC}"/>
+              </a:ext>
+            </a:extLst>
+          </p:cNvPr>
+          <p:cNvPicPr>
+            <a:picLocks noChangeAspect="1" noChangeArrowheads="1"/>
+          </p:cNvPicPr>
+          <p:nvPr/>
+        </p:nvPicPr>
+        <p:blipFill>
+          <a:blip r:embed="rId11">
+            <a:extLst>
+              <a:ext uri="{28A0092B-C50C-407E-A947-70E740481C1C}">
+                <a14:useLocalDpi xmlns:a14="http://schemas.microsoft.com/office/drawing/2010/main" val="0"/>
+              </a:ext>
+            </a:extLst>
+          </a:blip>
+          <a:srcRect/>
+          <a:stretch>
+            <a:fillRect/>
+          </a:stretch>
+        </p:blipFill>
+        <p:spPr bwMode="auto">
+          <a:xfrm>
+            <a:off x="10458180" y="4125494"/>
+            <a:ext cx="762000" cy="762000"/>
+          </a:xfrm>
+          <a:prstGeom prst="rect">
+            <a:avLst/>
+          </a:prstGeom>
+          <a:noFill/>
+          <a:ln>
+            <a:noFill/>
+          </a:ln>
+          <a:extLst>
+            <a:ext uri="{909E8E84-426E-40DD-AFC4-6F175D3DCCD1}">
+              <a14:hiddenFill xmlns:a14="http://schemas.microsoft.com/office/drawing/2010/main">
+                <a:solidFill>
+                  <a:srgbClr val="FFFFFF"/>
+                </a:solidFill>
+              </a14:hiddenFill>
+            </a:ext>
+            <a:ext uri="{91240B29-F687-4F45-9708-019B960494DF}">
+              <a14:hiddenLine xmlns:a14="http://schemas.microsoft.com/office/drawing/2010/main" w="9525">
+                <a:solidFill>
+                  <a:srgbClr val="000000"/>
+                </a:solidFill>
+                <a:miter lim="800000"/>
+                <a:headEnd/>
+                <a:tailEnd/>
+              </a14:hiddenLine>
+            </a:ext>
+          </a:extLst>
+        </p:spPr>
+      </p:pic>
+      <p:sp>
+        <p:nvSpPr>
+          <p:cNvPr id="110" name="TextBox 11">
+            <a:extLst>
+              <a:ext uri="{FF2B5EF4-FFF2-40B4-BE49-F238E27FC236}">
+                <a16:creationId xmlns:a16="http://schemas.microsoft.com/office/drawing/2014/main" id="{A1371D3B-EB96-5949-8D58-D14A0EC425CA}"/>
+              </a:ext>
+            </a:extLst>
+          </p:cNvPr>
+          <p:cNvSpPr txBox="1">
+            <a:spLocks noChangeArrowheads="1"/>
+          </p:cNvSpPr>
+          <p:nvPr/>
+        </p:nvSpPr>
+        <p:spPr bwMode="auto">
+          <a:xfrm>
+            <a:off x="9700943" y="4889081"/>
+            <a:ext cx="2292350" cy="461665"/>
+          </a:xfrm>
+          <a:prstGeom prst="rect">
+            <a:avLst/>
+          </a:prstGeom>
+          <a:noFill/>
+          <a:ln>
+            <a:noFill/>
+          </a:ln>
+          <a:extLst>
+            <a:ext uri="{909E8E84-426E-40DD-AFC4-6F175D3DCCD1}">
+              <a14:hiddenFill xmlns:a14="http://schemas.microsoft.com/office/drawing/2010/main">
+                <a:solidFill>
+                  <a:srgbClr val="FFFFFF"/>
+                </a:solidFill>
+              </a14:hiddenFill>
+            </a:ext>
+            <a:ext uri="{91240B29-F687-4F45-9708-019B960494DF}">
+              <a14:hiddenLine xmlns:a14="http://schemas.microsoft.com/office/drawing/2010/main" w="9525">
+                <a:solidFill>
+                  <a:srgbClr val="000000"/>
+                </a:solidFill>
+                <a:miter lim="800000"/>
+                <a:headEnd/>
+                <a:tailEnd/>
+              </a14:hiddenLine>
+            </a:ext>
+          </a:extLst>
+        </p:spPr>
+        <p:txBody>
+          <a:bodyPr>
+            <a:spAutoFit/>
+          </a:bodyPr>
+          <a:lstStyle>
+            <a:lvl1pPr>
+              <a:defRPr>
+                <a:solidFill>
+                  <a:schemeClr val="tx1"/>
+                </a:solidFill>
+                <a:latin typeface="Calibri" panose="020F0502020204030204" pitchFamily="34" charset="0"/>
+              </a:defRPr>
+            </a:lvl1pPr>
+            <a:lvl2pPr marL="742950" indent="-285750">
+              <a:defRPr>
+                <a:solidFill>
+                  <a:schemeClr val="tx1"/>
+                </a:solidFill>
+                <a:latin typeface="Calibri" panose="020F0502020204030204" pitchFamily="34" charset="0"/>
+              </a:defRPr>
+            </a:lvl2pPr>
+            <a:lvl3pPr marL="1143000" indent="-228600">
+              <a:defRPr>
+                <a:solidFill>
+                  <a:schemeClr val="tx1"/>
+                </a:solidFill>
+                <a:latin typeface="Calibri" panose="020F0502020204030204" pitchFamily="34" charset="0"/>
+              </a:defRPr>
+            </a:lvl3pPr>
+            <a:lvl4pPr marL="1600200" indent="-228600">
+              <a:defRPr>
+                <a:solidFill>
+                  <a:schemeClr val="tx1"/>
+                </a:solidFill>
+                <a:latin typeface="Calibri" panose="020F0502020204030204" pitchFamily="34" charset="0"/>
+              </a:defRPr>
+            </a:lvl4pPr>
+            <a:lvl5pPr marL="2057400" indent="-228600">
+              <a:defRPr>
+                <a:solidFill>
+                  <a:schemeClr val="tx1"/>
+                </a:solidFill>
+                <a:latin typeface="Calibri" panose="020F0502020204030204" pitchFamily="34" charset="0"/>
+              </a:defRPr>
+            </a:lvl5pPr>
+            <a:lvl6pPr marL="2514600" indent="-228600" eaLnBrk="0" fontAlgn="base" hangingPunct="0">
+              <a:spcBef>
+                <a:spcPct val="0"/>
+              </a:spcBef>
+              <a:spcAft>
+                <a:spcPct val="0"/>
+              </a:spcAft>
+              <a:defRPr>
+                <a:solidFill>
+                  <a:schemeClr val="tx1"/>
+                </a:solidFill>
+                <a:latin typeface="Calibri" panose="020F0502020204030204" pitchFamily="34" charset="0"/>
+              </a:defRPr>
+            </a:lvl6pPr>
+            <a:lvl7pPr marL="2971800" indent="-228600" eaLnBrk="0" fontAlgn="base" hangingPunct="0">
+              <a:spcBef>
+                <a:spcPct val="0"/>
+              </a:spcBef>
+              <a:spcAft>
+                <a:spcPct val="0"/>
+              </a:spcAft>
+              <a:defRPr>
+                <a:solidFill>
+                  <a:schemeClr val="tx1"/>
+                </a:solidFill>
+                <a:latin typeface="Calibri" panose="020F0502020204030204" pitchFamily="34" charset="0"/>
+              </a:defRPr>
+            </a:lvl7pPr>
+            <a:lvl8pPr marL="3429000" indent="-228600" eaLnBrk="0" fontAlgn="base" hangingPunct="0">
+              <a:spcBef>
+                <a:spcPct val="0"/>
+              </a:spcBef>
+              <a:spcAft>
+                <a:spcPct val="0"/>
+              </a:spcAft>
+              <a:defRPr>
+                <a:solidFill>
+                  <a:schemeClr val="tx1"/>
+                </a:solidFill>
+                <a:latin typeface="Calibri" panose="020F0502020204030204" pitchFamily="34" charset="0"/>
+              </a:defRPr>
+            </a:lvl8pPr>
+            <a:lvl9pPr marL="3886200" indent="-228600" eaLnBrk="0" fontAlgn="base" hangingPunct="0">
+              <a:spcBef>
+                <a:spcPct val="0"/>
+              </a:spcBef>
+              <a:spcAft>
+                <a:spcPct val="0"/>
+              </a:spcAft>
+              <a:defRPr>
+                <a:solidFill>
+                  <a:schemeClr val="tx1"/>
+                </a:solidFill>
+                <a:latin typeface="Calibri" panose="020F0502020204030204" pitchFamily="34" charset="0"/>
+              </a:defRPr>
+            </a:lvl9pPr>
+          </a:lstStyle>
+          <a:p>
+            <a:pPr algn="ctr" eaLnBrk="1" hangingPunct="1"/>
+            <a:r>
+              <a:rPr lang="en-US" altLang="en-US" sz="1200" dirty="0">
+                <a:latin typeface="Arial" panose="020B0604020202020204" pitchFamily="34" charset="0"/>
+                <a:ea typeface="Amazon Ember" panose="020B0603020204020204" pitchFamily="34" charset="0"/>
+                <a:cs typeface="Arial" panose="020B0604020202020204" pitchFamily="34" charset="0"/>
+              </a:rPr>
+              <a:t>Amazon Simple Queue Service (Amazon SQS)</a:t>
+            </a:r>
+          </a:p>
+        </p:txBody>
+      </p:sp>
     </p:spTree>
     <p:extLst>
       <p:ext uri="{BB962C8B-B14F-4D97-AF65-F5344CB8AC3E}">

</xml_diff>